<commit_message>
v0.01 ... had to move to word (old school) as rendering got a complete mess :(
</commit_message>
<xml_diff>
--- a/figures/figures-self-drawn.pptx
+++ b/figures/figures-self-drawn.pptx
@@ -7,6 +7,7 @@
   <p:sldIdLst>
     <p:sldId id="257" r:id="rId2"/>
     <p:sldId id="256" r:id="rId3"/>
+    <p:sldId id="258" r:id="rId4"/>
   </p:sldIdLst>
   <p:sldSz cx="12192000" cy="6858000"/>
   <p:notesSz cx="6858000" cy="9144000"/>
@@ -244,7 +245,7 @@
           <a:p>
             <a:fld id="{3C2CF9B3-DF89-4EB8-83B1-CA721AF4682E}" type="datetimeFigureOut">
               <a:rPr lang="en-GB" smtClean="0"/>
-              <a:t>12-07-2021</a:t>
+              <a:t>22-07-2021</a:t>
             </a:fld>
             <a:endParaRPr lang="en-GB"/>
           </a:p>
@@ -414,7 +415,7 @@
           <a:p>
             <a:fld id="{3C2CF9B3-DF89-4EB8-83B1-CA721AF4682E}" type="datetimeFigureOut">
               <a:rPr lang="en-GB" smtClean="0"/>
-              <a:t>12-07-2021</a:t>
+              <a:t>22-07-2021</a:t>
             </a:fld>
             <a:endParaRPr lang="en-GB"/>
           </a:p>
@@ -594,7 +595,7 @@
           <a:p>
             <a:fld id="{3C2CF9B3-DF89-4EB8-83B1-CA721AF4682E}" type="datetimeFigureOut">
               <a:rPr lang="en-GB" smtClean="0"/>
-              <a:t>12-07-2021</a:t>
+              <a:t>22-07-2021</a:t>
             </a:fld>
             <a:endParaRPr lang="en-GB"/>
           </a:p>
@@ -764,7 +765,7 @@
           <a:p>
             <a:fld id="{3C2CF9B3-DF89-4EB8-83B1-CA721AF4682E}" type="datetimeFigureOut">
               <a:rPr lang="en-GB" smtClean="0"/>
-              <a:t>12-07-2021</a:t>
+              <a:t>22-07-2021</a:t>
             </a:fld>
             <a:endParaRPr lang="en-GB"/>
           </a:p>
@@ -1010,7 +1011,7 @@
           <a:p>
             <a:fld id="{3C2CF9B3-DF89-4EB8-83B1-CA721AF4682E}" type="datetimeFigureOut">
               <a:rPr lang="en-GB" smtClean="0"/>
-              <a:t>12-07-2021</a:t>
+              <a:t>22-07-2021</a:t>
             </a:fld>
             <a:endParaRPr lang="en-GB"/>
           </a:p>
@@ -1242,7 +1243,7 @@
           <a:p>
             <a:fld id="{3C2CF9B3-DF89-4EB8-83B1-CA721AF4682E}" type="datetimeFigureOut">
               <a:rPr lang="en-GB" smtClean="0"/>
-              <a:t>12-07-2021</a:t>
+              <a:t>22-07-2021</a:t>
             </a:fld>
             <a:endParaRPr lang="en-GB"/>
           </a:p>
@@ -1609,7 +1610,7 @@
           <a:p>
             <a:fld id="{3C2CF9B3-DF89-4EB8-83B1-CA721AF4682E}" type="datetimeFigureOut">
               <a:rPr lang="en-GB" smtClean="0"/>
-              <a:t>12-07-2021</a:t>
+              <a:t>22-07-2021</a:t>
             </a:fld>
             <a:endParaRPr lang="en-GB"/>
           </a:p>
@@ -1727,7 +1728,7 @@
           <a:p>
             <a:fld id="{3C2CF9B3-DF89-4EB8-83B1-CA721AF4682E}" type="datetimeFigureOut">
               <a:rPr lang="en-GB" smtClean="0"/>
-              <a:t>12-07-2021</a:t>
+              <a:t>22-07-2021</a:t>
             </a:fld>
             <a:endParaRPr lang="en-GB"/>
           </a:p>
@@ -1822,7 +1823,7 @@
           <a:p>
             <a:fld id="{3C2CF9B3-DF89-4EB8-83B1-CA721AF4682E}" type="datetimeFigureOut">
               <a:rPr lang="en-GB" smtClean="0"/>
-              <a:t>12-07-2021</a:t>
+              <a:t>22-07-2021</a:t>
             </a:fld>
             <a:endParaRPr lang="en-GB"/>
           </a:p>
@@ -2099,7 +2100,7 @@
           <a:p>
             <a:fld id="{3C2CF9B3-DF89-4EB8-83B1-CA721AF4682E}" type="datetimeFigureOut">
               <a:rPr lang="en-GB" smtClean="0"/>
-              <a:t>12-07-2021</a:t>
+              <a:t>22-07-2021</a:t>
             </a:fld>
             <a:endParaRPr lang="en-GB"/>
           </a:p>
@@ -2352,7 +2353,7 @@
           <a:p>
             <a:fld id="{3C2CF9B3-DF89-4EB8-83B1-CA721AF4682E}" type="datetimeFigureOut">
               <a:rPr lang="en-GB" smtClean="0"/>
-              <a:t>12-07-2021</a:t>
+              <a:t>22-07-2021</a:t>
             </a:fld>
             <a:endParaRPr lang="en-GB"/>
           </a:p>
@@ -2565,7 +2566,7 @@
           <a:p>
             <a:fld id="{3C2CF9B3-DF89-4EB8-83B1-CA721AF4682E}" type="datetimeFigureOut">
               <a:rPr lang="en-GB" smtClean="0"/>
-              <a:t>12-07-2021</a:t>
+              <a:t>22-07-2021</a:t>
             </a:fld>
             <a:endParaRPr lang="en-GB"/>
           </a:p>
@@ -8049,6 +8050,126 @@
 </p:sld>
 </file>
 
+<file path=ppt/slides/slide3.xml><?xml version="1.0" encoding="utf-8"?>
+<p:sld xmlns:a="http://schemas.openxmlformats.org/drawingml/2006/main" xmlns:r="http://schemas.openxmlformats.org/officeDocument/2006/relationships" xmlns:p="http://schemas.openxmlformats.org/presentationml/2006/main">
+  <p:cSld>
+    <p:spTree>
+      <p:nvGrpSpPr>
+        <p:cNvPr id="1" name=""/>
+        <p:cNvGrpSpPr/>
+        <p:nvPr/>
+      </p:nvGrpSpPr>
+      <p:grpSpPr>
+        <a:xfrm>
+          <a:off x="0" y="0"/>
+          <a:ext cx="0" cy="0"/>
+          <a:chOff x="0" y="0"/>
+          <a:chExt cx="0" cy="0"/>
+        </a:xfrm>
+      </p:grpSpPr>
+      <p:pic>
+        <p:nvPicPr>
+          <p:cNvPr id="2" name="Picture"/>
+          <p:cNvPicPr/>
+          <p:nvPr/>
+        </p:nvPicPr>
+        <p:blipFill>
+          <a:blip r:embed="rId2"/>
+          <a:stretch>
+            <a:fillRect/>
+          </a:stretch>
+        </p:blipFill>
+        <p:spPr bwMode="auto">
+          <a:xfrm>
+            <a:off x="654342" y="771787"/>
+            <a:ext cx="7865378" cy="4304403"/>
+          </a:xfrm>
+          <a:prstGeom prst="rect">
+            <a:avLst/>
+          </a:prstGeom>
+          <a:noFill/>
+          <a:ln w="9525">
+            <a:noFill/>
+            <a:headEnd/>
+            <a:tailEnd/>
+          </a:ln>
+        </p:spPr>
+      </p:pic>
+      <p:pic>
+        <p:nvPicPr>
+          <p:cNvPr id="3" name="Picture" descr="Figure 3.4: Resilience concept applied to observed US air traffic development"/>
+          <p:cNvPicPr/>
+          <p:nvPr/>
+        </p:nvPicPr>
+        <p:blipFill>
+          <a:blip r:embed="rId3"/>
+          <a:stretch>
+            <a:fillRect/>
+          </a:stretch>
+        </p:blipFill>
+        <p:spPr bwMode="auto">
+          <a:xfrm>
+            <a:off x="6465815" y="3040158"/>
+            <a:ext cx="5334000" cy="3294380"/>
+          </a:xfrm>
+          <a:prstGeom prst="rect">
+            <a:avLst/>
+          </a:prstGeom>
+          <a:noFill/>
+          <a:ln w="9525">
+            <a:noFill/>
+            <a:headEnd/>
+            <a:tailEnd/>
+          </a:ln>
+        </p:spPr>
+      </p:pic>
+      <p:sp>
+        <p:nvSpPr>
+          <p:cNvPr id="4" name="TextBox 3"/>
+          <p:cNvSpPr txBox="1"/>
+          <p:nvPr/>
+        </p:nvSpPr>
+        <p:spPr>
+          <a:xfrm>
+            <a:off x="8607105" y="662730"/>
+            <a:ext cx="2004968" cy="646331"/>
+          </a:xfrm>
+          <a:prstGeom prst="rect">
+            <a:avLst/>
+          </a:prstGeom>
+          <a:noFill/>
+        </p:spPr>
+        <p:txBody>
+          <a:bodyPr wrap="square" rtlCol="0">
+            <a:spAutoFit/>
+          </a:bodyPr>
+          <a:lstStyle/>
+          <a:p>
+            <a:r>
+              <a:rPr lang="en-GB" dirty="0" smtClean="0"/>
+              <a:t>Try to remove </a:t>
+            </a:r>
+            <a:r>
+              <a:rPr lang="en-GB" smtClean="0"/>
+              <a:t>grey band</a:t>
+            </a:r>
+            <a:endParaRPr lang="en-GB"/>
+          </a:p>
+        </p:txBody>
+      </p:sp>
+    </p:spTree>
+    <p:extLst>
+      <p:ext uri="{BB962C8B-B14F-4D97-AF65-F5344CB8AC3E}">
+        <p14:creationId xmlns:p14="http://schemas.microsoft.com/office/powerpoint/2010/main" val="2560642378"/>
+      </p:ext>
+    </p:extLst>
+  </p:cSld>
+  <p:clrMapOvr>
+    <a:masterClrMapping/>
+  </p:clrMapOvr>
+</p:sld>
+</file>
+
 <file path=ppt/theme/theme1.xml><?xml version="1.0" encoding="utf-8"?>
 <a:theme xmlns:a="http://schemas.openxmlformats.org/drawingml/2006/main" name="Office Theme">
   <a:themeElements>

</xml_diff>

<commit_message>
next round of references included
</commit_message>
<xml_diff>
--- a/figures/figures-self-drawn.pptx
+++ b/figures/figures-self-drawn.pptx
@@ -8,6 +8,7 @@
     <p:sldId id="257" r:id="rId2"/>
     <p:sldId id="256" r:id="rId3"/>
     <p:sldId id="258" r:id="rId4"/>
+    <p:sldId id="259" r:id="rId5"/>
   </p:sldIdLst>
   <p:sldSz cx="12192000" cy="6858000"/>
   <p:notesSz cx="6858000" cy="9144000"/>
@@ -8147,13 +8148,9 @@
           <a:p>
             <a:r>
               <a:rPr lang="en-GB" dirty="0" smtClean="0"/>
-              <a:t>Try to remove </a:t>
+              <a:t>Try to remove grey band</a:t>
             </a:r>
-            <a:r>
-              <a:rPr lang="en-GB" smtClean="0"/>
-              <a:t>grey band</a:t>
-            </a:r>
-            <a:endParaRPr lang="en-GB"/>
+            <a:endParaRPr lang="en-GB" dirty="0"/>
           </a:p>
         </p:txBody>
       </p:sp>
@@ -8161,6 +8158,64 @@
     <p:extLst>
       <p:ext uri="{BB962C8B-B14F-4D97-AF65-F5344CB8AC3E}">
         <p14:creationId xmlns:p14="http://schemas.microsoft.com/office/powerpoint/2010/main" val="2560642378"/>
+      </p:ext>
+    </p:extLst>
+  </p:cSld>
+  <p:clrMapOvr>
+    <a:masterClrMapping/>
+  </p:clrMapOvr>
+</p:sld>
+</file>
+
+<file path=ppt/slides/slide4.xml><?xml version="1.0" encoding="utf-8"?>
+<p:sld xmlns:a="http://schemas.openxmlformats.org/drawingml/2006/main" xmlns:r="http://schemas.openxmlformats.org/officeDocument/2006/relationships" xmlns:p="http://schemas.openxmlformats.org/presentationml/2006/main">
+  <p:cSld>
+    <p:spTree>
+      <p:nvGrpSpPr>
+        <p:cNvPr id="1" name=""/>
+        <p:cNvGrpSpPr/>
+        <p:nvPr/>
+      </p:nvGrpSpPr>
+      <p:grpSpPr>
+        <a:xfrm>
+          <a:off x="0" y="0"/>
+          <a:ext cx="0" cy="0"/>
+          <a:chOff x="0" y="0"/>
+          <a:chExt cx="0" cy="0"/>
+        </a:xfrm>
+      </p:grpSpPr>
+      <p:pic>
+        <p:nvPicPr>
+          <p:cNvPr id="2" name="Picture" descr="Figure 4.1: Timeline for United States, Europe, and Brazil"/>
+          <p:cNvPicPr/>
+          <p:nvPr/>
+        </p:nvPicPr>
+        <p:blipFill>
+          <a:blip r:embed="rId2"/>
+          <a:stretch>
+            <a:fillRect/>
+          </a:stretch>
+        </p:blipFill>
+        <p:spPr bwMode="auto">
+          <a:xfrm>
+            <a:off x="2021747" y="1568741"/>
+            <a:ext cx="6741253" cy="3507449"/>
+          </a:xfrm>
+          <a:prstGeom prst="rect">
+            <a:avLst/>
+          </a:prstGeom>
+          <a:noFill/>
+          <a:ln w="9525">
+            <a:noFill/>
+            <a:headEnd/>
+            <a:tailEnd/>
+          </a:ln>
+        </p:spPr>
+      </p:pic>
+    </p:spTree>
+    <p:extLst>
+      <p:ext uri="{BB962C8B-B14F-4D97-AF65-F5344CB8AC3E}">
+        <p14:creationId xmlns:p14="http://schemas.microsoft.com/office/powerpoint/2010/main" val="1911037541"/>
       </p:ext>
     </p:extLst>
   </p:cSld>

</xml_diff>

<commit_message>
v0.1 final push - now working through Word version to finalise it
</commit_message>
<xml_diff>
--- a/figures/figures-self-drawn.pptx
+++ b/figures/figures-self-drawn.pptx
@@ -246,7 +246,7 @@
           <a:p>
             <a:fld id="{3C2CF9B3-DF89-4EB8-83B1-CA721AF4682E}" type="datetimeFigureOut">
               <a:rPr lang="en-GB" smtClean="0"/>
-              <a:t>22-07-2021</a:t>
+              <a:t>23-07-2021</a:t>
             </a:fld>
             <a:endParaRPr lang="en-GB"/>
           </a:p>
@@ -416,7 +416,7 @@
           <a:p>
             <a:fld id="{3C2CF9B3-DF89-4EB8-83B1-CA721AF4682E}" type="datetimeFigureOut">
               <a:rPr lang="en-GB" smtClean="0"/>
-              <a:t>22-07-2021</a:t>
+              <a:t>23-07-2021</a:t>
             </a:fld>
             <a:endParaRPr lang="en-GB"/>
           </a:p>
@@ -596,7 +596,7 @@
           <a:p>
             <a:fld id="{3C2CF9B3-DF89-4EB8-83B1-CA721AF4682E}" type="datetimeFigureOut">
               <a:rPr lang="en-GB" smtClean="0"/>
-              <a:t>22-07-2021</a:t>
+              <a:t>23-07-2021</a:t>
             </a:fld>
             <a:endParaRPr lang="en-GB"/>
           </a:p>
@@ -766,7 +766,7 @@
           <a:p>
             <a:fld id="{3C2CF9B3-DF89-4EB8-83B1-CA721AF4682E}" type="datetimeFigureOut">
               <a:rPr lang="en-GB" smtClean="0"/>
-              <a:t>22-07-2021</a:t>
+              <a:t>23-07-2021</a:t>
             </a:fld>
             <a:endParaRPr lang="en-GB"/>
           </a:p>
@@ -1012,7 +1012,7 @@
           <a:p>
             <a:fld id="{3C2CF9B3-DF89-4EB8-83B1-CA721AF4682E}" type="datetimeFigureOut">
               <a:rPr lang="en-GB" smtClean="0"/>
-              <a:t>22-07-2021</a:t>
+              <a:t>23-07-2021</a:t>
             </a:fld>
             <a:endParaRPr lang="en-GB"/>
           </a:p>
@@ -1244,7 +1244,7 @@
           <a:p>
             <a:fld id="{3C2CF9B3-DF89-4EB8-83B1-CA721AF4682E}" type="datetimeFigureOut">
               <a:rPr lang="en-GB" smtClean="0"/>
-              <a:t>22-07-2021</a:t>
+              <a:t>23-07-2021</a:t>
             </a:fld>
             <a:endParaRPr lang="en-GB"/>
           </a:p>
@@ -1611,7 +1611,7 @@
           <a:p>
             <a:fld id="{3C2CF9B3-DF89-4EB8-83B1-CA721AF4682E}" type="datetimeFigureOut">
               <a:rPr lang="en-GB" smtClean="0"/>
-              <a:t>22-07-2021</a:t>
+              <a:t>23-07-2021</a:t>
             </a:fld>
             <a:endParaRPr lang="en-GB"/>
           </a:p>
@@ -1729,7 +1729,7 @@
           <a:p>
             <a:fld id="{3C2CF9B3-DF89-4EB8-83B1-CA721AF4682E}" type="datetimeFigureOut">
               <a:rPr lang="en-GB" smtClean="0"/>
-              <a:t>22-07-2021</a:t>
+              <a:t>23-07-2021</a:t>
             </a:fld>
             <a:endParaRPr lang="en-GB"/>
           </a:p>
@@ -1824,7 +1824,7 @@
           <a:p>
             <a:fld id="{3C2CF9B3-DF89-4EB8-83B1-CA721AF4682E}" type="datetimeFigureOut">
               <a:rPr lang="en-GB" smtClean="0"/>
-              <a:t>22-07-2021</a:t>
+              <a:t>23-07-2021</a:t>
             </a:fld>
             <a:endParaRPr lang="en-GB"/>
           </a:p>
@@ -2101,7 +2101,7 @@
           <a:p>
             <a:fld id="{3C2CF9B3-DF89-4EB8-83B1-CA721AF4682E}" type="datetimeFigureOut">
               <a:rPr lang="en-GB" smtClean="0"/>
-              <a:t>22-07-2021</a:t>
+              <a:t>23-07-2021</a:t>
             </a:fld>
             <a:endParaRPr lang="en-GB"/>
           </a:p>
@@ -2354,7 +2354,7 @@
           <a:p>
             <a:fld id="{3C2CF9B3-DF89-4EB8-83B1-CA721AF4682E}" type="datetimeFigureOut">
               <a:rPr lang="en-GB" smtClean="0"/>
-              <a:t>22-07-2021</a:t>
+              <a:t>23-07-2021</a:t>
             </a:fld>
             <a:endParaRPr lang="en-GB"/>
           </a:p>
@@ -2567,7 +2567,7 @@
           <a:p>
             <a:fld id="{3C2CF9B3-DF89-4EB8-83B1-CA721AF4682E}" type="datetimeFigureOut">
               <a:rPr lang="en-GB" smtClean="0"/>
-              <a:t>22-07-2021</a:t>
+              <a:t>23-07-2021</a:t>
             </a:fld>
             <a:endParaRPr lang="en-GB"/>
           </a:p>
@@ -3137,7 +3137,7 @@
           <a:lstStyle/>
           <a:p>
             <a:pPr algn="ctr"/>
-            <a:endParaRPr lang="en-GB"/>
+            <a:endParaRPr lang="en-GB" dirty="0"/>
           </a:p>
         </p:txBody>
       </p:sp>
@@ -3183,7 +3183,7 @@
         </p:nvSpPr>
         <p:spPr>
           <a:xfrm>
-            <a:off x="3248025" y="3684725"/>
+            <a:off x="3541181" y="4344472"/>
             <a:ext cx="1047750" cy="1247775"/>
           </a:xfrm>
           <a:prstGeom prst="can">
@@ -3223,7 +3223,7 @@
         </p:nvSpPr>
         <p:spPr>
           <a:xfrm>
-            <a:off x="3133725" y="3324910"/>
+            <a:off x="2027790" y="2364343"/>
             <a:ext cx="1704975" cy="369332"/>
           </a:xfrm>
           <a:prstGeom prst="rect">
@@ -3238,8 +3238,8 @@
           <a:lstStyle/>
           <a:p>
             <a:r>
-              <a:rPr lang="en-GB" dirty="0" smtClean="0"/>
-              <a:t>John Hopkins</a:t>
+              <a:rPr lang="en-GB" dirty="0" err="1" smtClean="0"/>
+              <a:t>ourairports</a:t>
             </a:r>
             <a:endParaRPr lang="en-GB" dirty="0"/>
           </a:p>
@@ -4009,6 +4009,196 @@
           <a:p>
             <a:pPr algn="ctr"/>
             <a:endParaRPr lang="en-GB"/>
+          </a:p>
+        </p:txBody>
+      </p:sp>
+      <p:sp>
+        <p:nvSpPr>
+          <p:cNvPr id="26" name="Can 25"/>
+          <p:cNvSpPr/>
+          <p:nvPr/>
+        </p:nvSpPr>
+        <p:spPr>
+          <a:xfrm>
+            <a:off x="2500311" y="2710160"/>
+            <a:ext cx="512515" cy="574515"/>
+          </a:xfrm>
+          <a:prstGeom prst="can">
+            <a:avLst/>
+          </a:prstGeom>
+        </p:spPr>
+        <p:style>
+          <a:lnRef idx="2">
+            <a:schemeClr val="accent1">
+              <a:shade val="50000"/>
+            </a:schemeClr>
+          </a:lnRef>
+          <a:fillRef idx="1">
+            <a:schemeClr val="accent1"/>
+          </a:fillRef>
+          <a:effectRef idx="0">
+            <a:schemeClr val="accent1"/>
+          </a:effectRef>
+          <a:fontRef idx="minor">
+            <a:schemeClr val="lt1"/>
+          </a:fontRef>
+        </p:style>
+        <p:txBody>
+          <a:bodyPr rtlCol="0" anchor="ctr"/>
+          <a:lstStyle/>
+          <a:p>
+            <a:pPr algn="ctr"/>
+            <a:endParaRPr lang="en-GB" dirty="0"/>
+          </a:p>
+        </p:txBody>
+      </p:sp>
+      <p:sp>
+        <p:nvSpPr>
+          <p:cNvPr id="27" name="Can 26"/>
+          <p:cNvSpPr/>
+          <p:nvPr/>
+        </p:nvSpPr>
+        <p:spPr>
+          <a:xfrm>
+            <a:off x="2773448" y="3324860"/>
+            <a:ext cx="512515" cy="574515"/>
+          </a:xfrm>
+          <a:prstGeom prst="can">
+            <a:avLst/>
+          </a:prstGeom>
+        </p:spPr>
+        <p:style>
+          <a:lnRef idx="2">
+            <a:schemeClr val="accent1">
+              <a:shade val="50000"/>
+            </a:schemeClr>
+          </a:lnRef>
+          <a:fillRef idx="1">
+            <a:schemeClr val="accent1"/>
+          </a:fillRef>
+          <a:effectRef idx="0">
+            <a:schemeClr val="accent1"/>
+          </a:effectRef>
+          <a:fontRef idx="minor">
+            <a:schemeClr val="lt1"/>
+          </a:fontRef>
+        </p:style>
+        <p:txBody>
+          <a:bodyPr rtlCol="0" anchor="ctr"/>
+          <a:lstStyle/>
+          <a:p>
+            <a:pPr algn="ctr"/>
+            <a:endParaRPr lang="en-GB" dirty="0"/>
+          </a:p>
+        </p:txBody>
+      </p:sp>
+      <p:sp>
+        <p:nvSpPr>
+          <p:cNvPr id="28" name="TextBox 27"/>
+          <p:cNvSpPr txBox="1"/>
+          <p:nvPr/>
+        </p:nvSpPr>
+        <p:spPr>
+          <a:xfrm>
+            <a:off x="2097881" y="4985856"/>
+            <a:ext cx="1704975" cy="369332"/>
+          </a:xfrm>
+          <a:prstGeom prst="rect">
+            <a:avLst/>
+          </a:prstGeom>
+          <a:noFill/>
+        </p:spPr>
+        <p:txBody>
+          <a:bodyPr wrap="square" rtlCol="0">
+            <a:spAutoFit/>
+          </a:bodyPr>
+          <a:lstStyle/>
+          <a:p>
+            <a:r>
+              <a:rPr lang="en-GB" dirty="0" smtClean="0"/>
+              <a:t>John Hopkins</a:t>
+            </a:r>
+            <a:endParaRPr lang="en-GB" dirty="0"/>
+          </a:p>
+        </p:txBody>
+      </p:sp>
+      <p:sp>
+        <p:nvSpPr>
+          <p:cNvPr id="29" name="TextBox 28"/>
+          <p:cNvSpPr txBox="1"/>
+          <p:nvPr/>
+        </p:nvSpPr>
+        <p:spPr>
+          <a:xfrm>
+            <a:off x="3285963" y="3310825"/>
+            <a:ext cx="2108114" cy="646331"/>
+          </a:xfrm>
+          <a:prstGeom prst="rect">
+            <a:avLst/>
+          </a:prstGeom>
+          <a:noFill/>
+        </p:spPr>
+        <p:txBody>
+          <a:bodyPr wrap="square" rtlCol="0">
+            <a:spAutoFit/>
+          </a:bodyPr>
+          <a:lstStyle/>
+          <a:p>
+            <a:r>
+              <a:rPr lang="en-GB" dirty="0" smtClean="0"/>
+              <a:t>Flanders Maritime Institute</a:t>
+            </a:r>
+            <a:endParaRPr lang="en-GB" dirty="0"/>
+          </a:p>
+        </p:txBody>
+      </p:sp>
+      <p:sp>
+        <p:nvSpPr>
+          <p:cNvPr id="30" name="Cloud 29"/>
+          <p:cNvSpPr/>
+          <p:nvPr/>
+        </p:nvSpPr>
+        <p:spPr>
+          <a:xfrm>
+            <a:off x="122448" y="3835377"/>
+            <a:ext cx="2377440" cy="1602144"/>
+          </a:xfrm>
+          <a:prstGeom prst="cloud">
+            <a:avLst/>
+          </a:prstGeom>
+        </p:spPr>
+        <p:style>
+          <a:lnRef idx="1">
+            <a:schemeClr val="accent1"/>
+          </a:lnRef>
+          <a:fillRef idx="2">
+            <a:schemeClr val="accent1"/>
+          </a:fillRef>
+          <a:effectRef idx="1">
+            <a:schemeClr val="accent1"/>
+          </a:effectRef>
+          <a:fontRef idx="minor">
+            <a:schemeClr val="dk1"/>
+          </a:fontRef>
+        </p:style>
+        <p:txBody>
+          <a:bodyPr rtlCol="0" anchor="ctr"/>
+          <a:lstStyle/>
+          <a:p>
+            <a:pPr algn="ctr"/>
+            <a:r>
+              <a:rPr lang="en-GB" dirty="0" smtClean="0"/>
+              <a:t>community-collected </a:t>
+            </a:r>
+            <a:r>
+              <a:rPr lang="en-GB" dirty="0" smtClean="0"/>
+              <a:t>COVID </a:t>
+            </a:r>
+            <a:r>
+              <a:rPr lang="en-GB" dirty="0" smtClean="0"/>
+              <a:t>data</a:t>
+            </a:r>
+            <a:endParaRPr lang="en-GB" dirty="0"/>
           </a:p>
         </p:txBody>
       </p:sp>

</xml_diff>

<commit_message>
v0.2 network level crunched with cleaned data and network level resilience vis - done
</commit_message>
<xml_diff>
--- a/figures/figures-self-drawn.pptx
+++ b/figures/figures-self-drawn.pptx
@@ -9,6 +9,7 @@
     <p:sldId id="256" r:id="rId3"/>
     <p:sldId id="258" r:id="rId4"/>
     <p:sldId id="259" r:id="rId5"/>
+    <p:sldId id="260" r:id="rId6"/>
   </p:sldIdLst>
   <p:sldSz cx="12192000" cy="6858000"/>
   <p:notesSz cx="6858000" cy="9144000"/>
@@ -8415,6 +8416,156 @@
 </p:sld>
 </file>
 
+<file path=ppt/slides/slide5.xml><?xml version="1.0" encoding="utf-8"?>
+<p:sld xmlns:a="http://schemas.openxmlformats.org/drawingml/2006/main" xmlns:r="http://schemas.openxmlformats.org/officeDocument/2006/relationships" xmlns:p="http://schemas.openxmlformats.org/presentationml/2006/main">
+  <p:cSld>
+    <p:spTree>
+      <p:nvGrpSpPr>
+        <p:cNvPr id="1" name=""/>
+        <p:cNvGrpSpPr/>
+        <p:nvPr/>
+      </p:nvGrpSpPr>
+      <p:grpSpPr>
+        <a:xfrm>
+          <a:off x="0" y="0"/>
+          <a:ext cx="0" cy="0"/>
+          <a:chOff x="0" y="0"/>
+          <a:chExt cx="0" cy="0"/>
+        </a:xfrm>
+      </p:grpSpPr>
+      <p:pic>
+        <p:nvPicPr>
+          <p:cNvPr id="2" name="Picture 1"/>
+          <p:cNvPicPr>
+            <a:picLocks noChangeAspect="1"/>
+          </p:cNvPicPr>
+          <p:nvPr/>
+        </p:nvPicPr>
+        <p:blipFill>
+          <a:blip r:embed="rId2" cstate="print">
+            <a:extLst>
+              <a:ext uri="{28A0092B-C50C-407E-A947-70E740481C1C}">
+                <a14:useLocalDpi xmlns:a14="http://schemas.microsoft.com/office/drawing/2010/main" val="0"/>
+              </a:ext>
+            </a:extLst>
+          </a:blip>
+          <a:stretch>
+            <a:fillRect/>
+          </a:stretch>
+        </p:blipFill>
+        <p:spPr>
+          <a:xfrm>
+            <a:off x="114841" y="939330"/>
+            <a:ext cx="5852442" cy="4389331"/>
+          </a:xfrm>
+          <a:prstGeom prst="rect">
+            <a:avLst/>
+          </a:prstGeom>
+        </p:spPr>
+      </p:pic>
+      <p:pic>
+        <p:nvPicPr>
+          <p:cNvPr id="3" name="Picture 2"/>
+          <p:cNvPicPr>
+            <a:picLocks noChangeAspect="1"/>
+          </p:cNvPicPr>
+          <p:nvPr/>
+        </p:nvPicPr>
+        <p:blipFill>
+          <a:blip r:embed="rId3" cstate="print">
+            <a:extLst>
+              <a:ext uri="{28A0092B-C50C-407E-A947-70E740481C1C}">
+                <a14:useLocalDpi xmlns:a14="http://schemas.microsoft.com/office/drawing/2010/main" val="0"/>
+              </a:ext>
+            </a:extLst>
+          </a:blip>
+          <a:stretch>
+            <a:fillRect/>
+          </a:stretch>
+        </p:blipFill>
+        <p:spPr>
+          <a:xfrm>
+            <a:off x="5967283" y="908849"/>
+            <a:ext cx="5852442" cy="4389331"/>
+          </a:xfrm>
+          <a:prstGeom prst="rect">
+            <a:avLst/>
+          </a:prstGeom>
+        </p:spPr>
+      </p:pic>
+      <p:sp>
+        <p:nvSpPr>
+          <p:cNvPr id="4" name="TextBox 3"/>
+          <p:cNvSpPr txBox="1"/>
+          <p:nvPr/>
+        </p:nvSpPr>
+        <p:spPr>
+          <a:xfrm>
+            <a:off x="10668000" y="4612640"/>
+            <a:ext cx="692882" cy="369332"/>
+          </a:xfrm>
+          <a:prstGeom prst="rect">
+            <a:avLst/>
+          </a:prstGeom>
+          <a:noFill/>
+        </p:spPr>
+        <p:txBody>
+          <a:bodyPr wrap="none" rtlCol="0">
+            <a:spAutoFit/>
+          </a:bodyPr>
+          <a:lstStyle/>
+          <a:p>
+            <a:r>
+              <a:rPr lang="en-GB" dirty="0" smtClean="0"/>
+              <a:t>Brazil</a:t>
+            </a:r>
+            <a:endParaRPr lang="en-GB" dirty="0"/>
+          </a:p>
+        </p:txBody>
+      </p:sp>
+      <p:sp>
+        <p:nvSpPr>
+          <p:cNvPr id="5" name="TextBox 4"/>
+          <p:cNvSpPr txBox="1"/>
+          <p:nvPr/>
+        </p:nvSpPr>
+        <p:spPr>
+          <a:xfrm>
+            <a:off x="4836879" y="4561840"/>
+            <a:ext cx="854208" cy="369332"/>
+          </a:xfrm>
+          <a:prstGeom prst="rect">
+            <a:avLst/>
+          </a:prstGeom>
+          <a:noFill/>
+        </p:spPr>
+        <p:txBody>
+          <a:bodyPr wrap="none" rtlCol="0">
+            <a:spAutoFit/>
+          </a:bodyPr>
+          <a:lstStyle/>
+          <a:p>
+            <a:r>
+              <a:rPr lang="en-GB" dirty="0" smtClean="0"/>
+              <a:t>Europe</a:t>
+            </a:r>
+            <a:endParaRPr lang="en-GB" dirty="0"/>
+          </a:p>
+        </p:txBody>
+      </p:sp>
+    </p:spTree>
+    <p:extLst>
+      <p:ext uri="{BB962C8B-B14F-4D97-AF65-F5344CB8AC3E}">
+        <p14:creationId xmlns:p14="http://schemas.microsoft.com/office/powerpoint/2010/main" val="2637143736"/>
+      </p:ext>
+    </p:extLst>
+  </p:cSld>
+  <p:clrMapOvr>
+    <a:masterClrMapping/>
+  </p:clrMapOvr>
+</p:sld>
+</file>
+
 <file path=ppt/theme/theme1.xml><?xml version="1.0" encoding="utf-8"?>
 <a:theme xmlns:a="http://schemas.openxmlformats.org/drawingml/2006/main" name="Office Theme">
   <a:themeElements>

</xml_diff>

<commit_message>
submitted version (Word & pdf), some supporting files for the final push
</commit_message>
<xml_diff>
--- a/figures/figures-self-drawn.pptx
+++ b/figures/figures-self-drawn.pptx
@@ -8,8 +8,9 @@
     <p:sldId id="257" r:id="rId2"/>
     <p:sldId id="256" r:id="rId3"/>
     <p:sldId id="258" r:id="rId4"/>
-    <p:sldId id="259" r:id="rId5"/>
-    <p:sldId id="260" r:id="rId6"/>
+    <p:sldId id="261" r:id="rId5"/>
+    <p:sldId id="259" r:id="rId6"/>
+    <p:sldId id="260" r:id="rId7"/>
   </p:sldIdLst>
   <p:sldSz cx="12192000" cy="6858000"/>
   <p:notesSz cx="6858000" cy="9144000"/>
@@ -8377,6 +8378,192 @@
       </p:grpSpPr>
       <p:pic>
         <p:nvPicPr>
+          <p:cNvPr id="2" name="Picture"/>
+          <p:cNvPicPr>
+            <a:picLocks noChangeAspect="1"/>
+          </p:cNvPicPr>
+          <p:nvPr/>
+        </p:nvPicPr>
+        <p:blipFill rotWithShape="1">
+          <a:blip r:embed="rId2"/>
+          <a:srcRect l="3748" r="25407" b="7605"/>
+          <a:stretch/>
+        </p:blipFill>
+        <p:spPr bwMode="auto">
+          <a:xfrm>
+            <a:off x="2235201" y="141813"/>
+            <a:ext cx="7896618" cy="6361563"/>
+          </a:xfrm>
+          <a:prstGeom prst="rect">
+            <a:avLst/>
+          </a:prstGeom>
+          <a:noFill/>
+          <a:ln>
+            <a:noFill/>
+          </a:ln>
+          <a:extLst>
+            <a:ext uri="{53640926-AAD7-44D8-BBD7-CCE9431645EC}">
+              <a14:shadowObscured xmlns:a14="http://schemas.microsoft.com/office/drawing/2010/main"/>
+            </a:ext>
+          </a:extLst>
+        </p:spPr>
+      </p:pic>
+      <p:sp>
+        <p:nvSpPr>
+          <p:cNvPr id="3" name="Rectangle 2"/>
+          <p:cNvSpPr/>
+          <p:nvPr/>
+        </p:nvSpPr>
+        <p:spPr>
+          <a:xfrm>
+            <a:off x="3373120" y="5659120"/>
+            <a:ext cx="6553200" cy="650240"/>
+          </a:xfrm>
+          <a:prstGeom prst="rect">
+            <a:avLst/>
+          </a:prstGeom>
+          <a:solidFill>
+            <a:schemeClr val="bg1"/>
+          </a:solidFill>
+          <a:ln>
+            <a:solidFill>
+              <a:schemeClr val="bg1"/>
+            </a:solidFill>
+          </a:ln>
+        </p:spPr>
+        <p:style>
+          <a:lnRef idx="2">
+            <a:schemeClr val="accent1">
+              <a:shade val="50000"/>
+            </a:schemeClr>
+          </a:lnRef>
+          <a:fillRef idx="1">
+            <a:schemeClr val="accent1"/>
+          </a:fillRef>
+          <a:effectRef idx="0">
+            <a:schemeClr val="accent1"/>
+          </a:effectRef>
+          <a:fontRef idx="minor">
+            <a:schemeClr val="lt1"/>
+          </a:fontRef>
+        </p:style>
+        <p:txBody>
+          <a:bodyPr rtlCol="0" anchor="ctr"/>
+          <a:lstStyle/>
+          <a:p>
+            <a:pPr algn="ctr"/>
+            <a:endParaRPr lang="en-GB"/>
+          </a:p>
+        </p:txBody>
+      </p:sp>
+      <p:sp>
+        <p:nvSpPr>
+          <p:cNvPr id="4" name="TextBox 3"/>
+          <p:cNvSpPr txBox="1"/>
+          <p:nvPr/>
+        </p:nvSpPr>
+        <p:spPr>
+          <a:xfrm>
+            <a:off x="4175760" y="4714240"/>
+            <a:ext cx="1290320" cy="646331"/>
+          </a:xfrm>
+          <a:prstGeom prst="rect">
+            <a:avLst/>
+          </a:prstGeom>
+          <a:noFill/>
+        </p:spPr>
+        <p:txBody>
+          <a:bodyPr wrap="square" rtlCol="0">
+            <a:spAutoFit/>
+          </a:bodyPr>
+          <a:lstStyle/>
+          <a:p>
+            <a:r>
+              <a:rPr lang="en-GB" dirty="0"/>
+              <a:t>d</a:t>
+            </a:r>
+            <a:r>
+              <a:rPr lang="en-GB" dirty="0" smtClean="0"/>
+              <a:t>isruptive</a:t>
+            </a:r>
+          </a:p>
+          <a:p>
+            <a:r>
+              <a:rPr lang="en-GB" dirty="0" smtClean="0"/>
+              <a:t>episode</a:t>
+            </a:r>
+            <a:endParaRPr lang="en-GB" dirty="0"/>
+          </a:p>
+        </p:txBody>
+      </p:sp>
+      <p:sp>
+        <p:nvSpPr>
+          <p:cNvPr id="5" name="TextBox 4"/>
+          <p:cNvSpPr txBox="1"/>
+          <p:nvPr/>
+        </p:nvSpPr>
+        <p:spPr>
+          <a:xfrm>
+            <a:off x="6183510" y="741680"/>
+            <a:ext cx="1290320" cy="646331"/>
+          </a:xfrm>
+          <a:prstGeom prst="rect">
+            <a:avLst/>
+          </a:prstGeom>
+          <a:noFill/>
+        </p:spPr>
+        <p:txBody>
+          <a:bodyPr wrap="square" rtlCol="0">
+            <a:spAutoFit/>
+          </a:bodyPr>
+          <a:lstStyle/>
+          <a:p>
+            <a:r>
+              <a:rPr lang="en-GB" dirty="0" smtClean="0"/>
+              <a:t>recovery</a:t>
+            </a:r>
+          </a:p>
+          <a:p>
+            <a:r>
+              <a:rPr lang="en-GB" dirty="0" smtClean="0"/>
+              <a:t>episode</a:t>
+            </a:r>
+            <a:endParaRPr lang="en-GB" dirty="0"/>
+          </a:p>
+        </p:txBody>
+      </p:sp>
+    </p:spTree>
+    <p:extLst>
+      <p:ext uri="{BB962C8B-B14F-4D97-AF65-F5344CB8AC3E}">
+        <p14:creationId xmlns:p14="http://schemas.microsoft.com/office/powerpoint/2010/main" val="1842684344"/>
+      </p:ext>
+    </p:extLst>
+  </p:cSld>
+  <p:clrMapOvr>
+    <a:masterClrMapping/>
+  </p:clrMapOvr>
+</p:sld>
+</file>
+
+<file path=ppt/slides/slide5.xml><?xml version="1.0" encoding="utf-8"?>
+<p:sld xmlns:a="http://schemas.openxmlformats.org/drawingml/2006/main" xmlns:r="http://schemas.openxmlformats.org/officeDocument/2006/relationships" xmlns:p="http://schemas.openxmlformats.org/presentationml/2006/main">
+  <p:cSld>
+    <p:spTree>
+      <p:nvGrpSpPr>
+        <p:cNvPr id="1" name=""/>
+        <p:cNvGrpSpPr/>
+        <p:nvPr/>
+      </p:nvGrpSpPr>
+      <p:grpSpPr>
+        <a:xfrm>
+          <a:off x="0" y="0"/>
+          <a:ext cx="0" cy="0"/>
+          <a:chOff x="0" y="0"/>
+          <a:chExt cx="0" cy="0"/>
+        </a:xfrm>
+      </p:grpSpPr>
+      <p:pic>
+        <p:nvPicPr>
           <p:cNvPr id="2" name="Picture" descr="Figure 4.1: Timeline for United States, Europe, and Brazil"/>
           <p:cNvPicPr/>
           <p:nvPr/>
@@ -8416,7 +8603,7 @@
 </p:sld>
 </file>
 
-<file path=ppt/slides/slide5.xml><?xml version="1.0" encoding="utf-8"?>
+<file path=ppt/slides/slide6.xml><?xml version="1.0" encoding="utf-8"?>
 <p:sld xmlns:a="http://schemas.openxmlformats.org/drawingml/2006/main" xmlns:r="http://schemas.openxmlformats.org/officeDocument/2006/relationships" xmlns:p="http://schemas.openxmlformats.org/presentationml/2006/main">
   <p:cSld>
     <p:spTree>

</xml_diff>